<commit_message>
[Livres] Retrait des livres Android pour des raison de Propriété intellectuelle
</commit_message>
<xml_diff>
--- a/document/jcertif-mob-dat.pptx
+++ b/document/jcertif-mob-dat.pptx
@@ -290,7 +290,8 @@
           <a:p>
             <a:fld id="{3B8C2624-D683-524F-9F7E-B731C6C02D7C}" type="datetimeFigureOut">
               <a:rPr lang="fr-FR" smtClean="0"/>
-              <a:t>13/06/11</a:t>
+              <a:pPr/>
+              <a:t>13/02/2012</a:t>
             </a:fld>
             <a:endParaRPr lang="fr-FR"/>
           </a:p>
@@ -332,7 +333,8 @@
           <a:p>
             <a:fld id="{CFD0DC95-9D6E-AF4D-909D-CFABA2629065}" type="slidenum">
               <a:rPr lang="fr-FR" smtClean="0"/>
-              <a:t>‹#›</a:t>
+              <a:pPr/>
+              <a:t>‹N°›</a:t>
             </a:fld>
             <a:endParaRPr lang="fr-FR"/>
           </a:p>
@@ -341,7 +343,7 @@
     </p:spTree>
     <p:extLst>
       <p:ext uri="{BB962C8B-B14F-4D97-AF65-F5344CB8AC3E}">
-        <p14:creationId xmlns:p14="http://schemas.microsoft.com/office/powerpoint/2010/main" val="975036867"/>
+        <p14:creationId xmlns:p14="http://schemas.microsoft.com/office/powerpoint/2010/main" xmlns="" val="975036867"/>
       </p:ext>
     </p:extLst>
   </p:cSld>
@@ -460,7 +462,8 @@
           <a:p>
             <a:fld id="{3B8C2624-D683-524F-9F7E-B731C6C02D7C}" type="datetimeFigureOut">
               <a:rPr lang="fr-FR" smtClean="0"/>
-              <a:t>13/06/11</a:t>
+              <a:pPr/>
+              <a:t>13/02/2012</a:t>
             </a:fld>
             <a:endParaRPr lang="fr-FR"/>
           </a:p>
@@ -502,7 +505,8 @@
           <a:p>
             <a:fld id="{CFD0DC95-9D6E-AF4D-909D-CFABA2629065}" type="slidenum">
               <a:rPr lang="fr-FR" smtClean="0"/>
-              <a:t>‹#›</a:t>
+              <a:pPr/>
+              <a:t>‹N°›</a:t>
             </a:fld>
             <a:endParaRPr lang="fr-FR"/>
           </a:p>
@@ -511,7 +515,7 @@
     </p:spTree>
     <p:extLst>
       <p:ext uri="{BB962C8B-B14F-4D97-AF65-F5344CB8AC3E}">
-        <p14:creationId xmlns:p14="http://schemas.microsoft.com/office/powerpoint/2010/main" val="350360448"/>
+        <p14:creationId xmlns:p14="http://schemas.microsoft.com/office/powerpoint/2010/main" xmlns="" val="350360448"/>
       </p:ext>
     </p:extLst>
   </p:cSld>
@@ -640,7 +644,8 @@
           <a:p>
             <a:fld id="{3B8C2624-D683-524F-9F7E-B731C6C02D7C}" type="datetimeFigureOut">
               <a:rPr lang="fr-FR" smtClean="0"/>
-              <a:t>13/06/11</a:t>
+              <a:pPr/>
+              <a:t>13/02/2012</a:t>
             </a:fld>
             <a:endParaRPr lang="fr-FR"/>
           </a:p>
@@ -682,7 +687,8 @@
           <a:p>
             <a:fld id="{CFD0DC95-9D6E-AF4D-909D-CFABA2629065}" type="slidenum">
               <a:rPr lang="fr-FR" smtClean="0"/>
-              <a:t>‹#›</a:t>
+              <a:pPr/>
+              <a:t>‹N°›</a:t>
             </a:fld>
             <a:endParaRPr lang="fr-FR"/>
           </a:p>
@@ -691,7 +697,7 @@
     </p:spTree>
     <p:extLst>
       <p:ext uri="{BB962C8B-B14F-4D97-AF65-F5344CB8AC3E}">
-        <p14:creationId xmlns:p14="http://schemas.microsoft.com/office/powerpoint/2010/main" val="2249446521"/>
+        <p14:creationId xmlns:p14="http://schemas.microsoft.com/office/powerpoint/2010/main" xmlns="" val="2249446521"/>
       </p:ext>
     </p:extLst>
   </p:cSld>
@@ -810,7 +816,8 @@
           <a:p>
             <a:fld id="{3B8C2624-D683-524F-9F7E-B731C6C02D7C}" type="datetimeFigureOut">
               <a:rPr lang="fr-FR" smtClean="0"/>
-              <a:t>13/06/11</a:t>
+              <a:pPr/>
+              <a:t>13/02/2012</a:t>
             </a:fld>
             <a:endParaRPr lang="fr-FR"/>
           </a:p>
@@ -852,7 +859,8 @@
           <a:p>
             <a:fld id="{CFD0DC95-9D6E-AF4D-909D-CFABA2629065}" type="slidenum">
               <a:rPr lang="fr-FR" smtClean="0"/>
-              <a:t>‹#›</a:t>
+              <a:pPr/>
+              <a:t>‹N°›</a:t>
             </a:fld>
             <a:endParaRPr lang="fr-FR"/>
           </a:p>
@@ -861,7 +869,7 @@
     </p:spTree>
     <p:extLst>
       <p:ext uri="{BB962C8B-B14F-4D97-AF65-F5344CB8AC3E}">
-        <p14:creationId xmlns:p14="http://schemas.microsoft.com/office/powerpoint/2010/main" val="962136368"/>
+        <p14:creationId xmlns:p14="http://schemas.microsoft.com/office/powerpoint/2010/main" xmlns="" val="962136368"/>
       </p:ext>
     </p:extLst>
   </p:cSld>
@@ -1056,7 +1064,8 @@
           <a:p>
             <a:fld id="{3B8C2624-D683-524F-9F7E-B731C6C02D7C}" type="datetimeFigureOut">
               <a:rPr lang="fr-FR" smtClean="0"/>
-              <a:t>13/06/11</a:t>
+              <a:pPr/>
+              <a:t>13/02/2012</a:t>
             </a:fld>
             <a:endParaRPr lang="fr-FR"/>
           </a:p>
@@ -1098,7 +1107,8 @@
           <a:p>
             <a:fld id="{CFD0DC95-9D6E-AF4D-909D-CFABA2629065}" type="slidenum">
               <a:rPr lang="fr-FR" smtClean="0"/>
-              <a:t>‹#›</a:t>
+              <a:pPr/>
+              <a:t>‹N°›</a:t>
             </a:fld>
             <a:endParaRPr lang="fr-FR"/>
           </a:p>
@@ -1107,7 +1117,7 @@
     </p:spTree>
     <p:extLst>
       <p:ext uri="{BB962C8B-B14F-4D97-AF65-F5344CB8AC3E}">
-        <p14:creationId xmlns:p14="http://schemas.microsoft.com/office/powerpoint/2010/main" val="1625313634"/>
+        <p14:creationId xmlns:p14="http://schemas.microsoft.com/office/powerpoint/2010/main" xmlns="" val="1625313634"/>
       </p:ext>
     </p:extLst>
   </p:cSld>
@@ -1344,7 +1354,8 @@
           <a:p>
             <a:fld id="{3B8C2624-D683-524F-9F7E-B731C6C02D7C}" type="datetimeFigureOut">
               <a:rPr lang="fr-FR" smtClean="0"/>
-              <a:t>13/06/11</a:t>
+              <a:pPr/>
+              <a:t>13/02/2012</a:t>
             </a:fld>
             <a:endParaRPr lang="fr-FR"/>
           </a:p>
@@ -1386,7 +1397,8 @@
           <a:p>
             <a:fld id="{CFD0DC95-9D6E-AF4D-909D-CFABA2629065}" type="slidenum">
               <a:rPr lang="fr-FR" smtClean="0"/>
-              <a:t>‹#›</a:t>
+              <a:pPr/>
+              <a:t>‹N°›</a:t>
             </a:fld>
             <a:endParaRPr lang="fr-FR"/>
           </a:p>
@@ -1395,7 +1407,7 @@
     </p:spTree>
     <p:extLst>
       <p:ext uri="{BB962C8B-B14F-4D97-AF65-F5344CB8AC3E}">
-        <p14:creationId xmlns:p14="http://schemas.microsoft.com/office/powerpoint/2010/main" val="2783443252"/>
+        <p14:creationId xmlns:p14="http://schemas.microsoft.com/office/powerpoint/2010/main" xmlns="" val="2783443252"/>
       </p:ext>
     </p:extLst>
   </p:cSld>
@@ -1766,7 +1778,8 @@
           <a:p>
             <a:fld id="{3B8C2624-D683-524F-9F7E-B731C6C02D7C}" type="datetimeFigureOut">
               <a:rPr lang="fr-FR" smtClean="0"/>
-              <a:t>13/06/11</a:t>
+              <a:pPr/>
+              <a:t>13/02/2012</a:t>
             </a:fld>
             <a:endParaRPr lang="fr-FR"/>
           </a:p>
@@ -1808,7 +1821,8 @@
           <a:p>
             <a:fld id="{CFD0DC95-9D6E-AF4D-909D-CFABA2629065}" type="slidenum">
               <a:rPr lang="fr-FR" smtClean="0"/>
-              <a:t>‹#›</a:t>
+              <a:pPr/>
+              <a:t>‹N°›</a:t>
             </a:fld>
             <a:endParaRPr lang="fr-FR"/>
           </a:p>
@@ -1817,7 +1831,7 @@
     </p:spTree>
     <p:extLst>
       <p:ext uri="{BB962C8B-B14F-4D97-AF65-F5344CB8AC3E}">
-        <p14:creationId xmlns:p14="http://schemas.microsoft.com/office/powerpoint/2010/main" val="3786547121"/>
+        <p14:creationId xmlns:p14="http://schemas.microsoft.com/office/powerpoint/2010/main" xmlns="" val="3786547121"/>
       </p:ext>
     </p:extLst>
   </p:cSld>
@@ -1884,7 +1898,8 @@
           <a:p>
             <a:fld id="{3B8C2624-D683-524F-9F7E-B731C6C02D7C}" type="datetimeFigureOut">
               <a:rPr lang="fr-FR" smtClean="0"/>
-              <a:t>13/06/11</a:t>
+              <a:pPr/>
+              <a:t>13/02/2012</a:t>
             </a:fld>
             <a:endParaRPr lang="fr-FR"/>
           </a:p>
@@ -1926,7 +1941,8 @@
           <a:p>
             <a:fld id="{CFD0DC95-9D6E-AF4D-909D-CFABA2629065}" type="slidenum">
               <a:rPr lang="fr-FR" smtClean="0"/>
-              <a:t>‹#›</a:t>
+              <a:pPr/>
+              <a:t>‹N°›</a:t>
             </a:fld>
             <a:endParaRPr lang="fr-FR"/>
           </a:p>
@@ -1935,7 +1951,7 @@
     </p:spTree>
     <p:extLst>
       <p:ext uri="{BB962C8B-B14F-4D97-AF65-F5344CB8AC3E}">
-        <p14:creationId xmlns:p14="http://schemas.microsoft.com/office/powerpoint/2010/main" val="3825122159"/>
+        <p14:creationId xmlns:p14="http://schemas.microsoft.com/office/powerpoint/2010/main" xmlns="" val="3825122159"/>
       </p:ext>
     </p:extLst>
   </p:cSld>
@@ -1979,7 +1995,8 @@
           <a:p>
             <a:fld id="{3B8C2624-D683-524F-9F7E-B731C6C02D7C}" type="datetimeFigureOut">
               <a:rPr lang="fr-FR" smtClean="0"/>
-              <a:t>13/06/11</a:t>
+              <a:pPr/>
+              <a:t>13/02/2012</a:t>
             </a:fld>
             <a:endParaRPr lang="fr-FR"/>
           </a:p>
@@ -2021,7 +2038,8 @@
           <a:p>
             <a:fld id="{CFD0DC95-9D6E-AF4D-909D-CFABA2629065}" type="slidenum">
               <a:rPr lang="fr-FR" smtClean="0"/>
-              <a:t>‹#›</a:t>
+              <a:pPr/>
+              <a:t>‹N°›</a:t>
             </a:fld>
             <a:endParaRPr lang="fr-FR"/>
           </a:p>
@@ -2030,7 +2048,7 @@
     </p:spTree>
     <p:extLst>
       <p:ext uri="{BB962C8B-B14F-4D97-AF65-F5344CB8AC3E}">
-        <p14:creationId xmlns:p14="http://schemas.microsoft.com/office/powerpoint/2010/main" val="957850171"/>
+        <p14:creationId xmlns:p14="http://schemas.microsoft.com/office/powerpoint/2010/main" xmlns="" val="957850171"/>
       </p:ext>
     </p:extLst>
   </p:cSld>
@@ -2256,7 +2274,8 @@
           <a:p>
             <a:fld id="{3B8C2624-D683-524F-9F7E-B731C6C02D7C}" type="datetimeFigureOut">
               <a:rPr lang="fr-FR" smtClean="0"/>
-              <a:t>13/06/11</a:t>
+              <a:pPr/>
+              <a:t>13/02/2012</a:t>
             </a:fld>
             <a:endParaRPr lang="fr-FR"/>
           </a:p>
@@ -2298,7 +2317,8 @@
           <a:p>
             <a:fld id="{CFD0DC95-9D6E-AF4D-909D-CFABA2629065}" type="slidenum">
               <a:rPr lang="fr-FR" smtClean="0"/>
-              <a:t>‹#›</a:t>
+              <a:pPr/>
+              <a:t>‹N°›</a:t>
             </a:fld>
             <a:endParaRPr lang="fr-FR"/>
           </a:p>
@@ -2307,7 +2327,7 @@
     </p:spTree>
     <p:extLst>
       <p:ext uri="{BB962C8B-B14F-4D97-AF65-F5344CB8AC3E}">
-        <p14:creationId xmlns:p14="http://schemas.microsoft.com/office/powerpoint/2010/main" val="1537006424"/>
+        <p14:creationId xmlns:p14="http://schemas.microsoft.com/office/powerpoint/2010/main" xmlns="" val="1537006424"/>
       </p:ext>
     </p:extLst>
   </p:cSld>
@@ -2509,7 +2529,8 @@
           <a:p>
             <a:fld id="{3B8C2624-D683-524F-9F7E-B731C6C02D7C}" type="datetimeFigureOut">
               <a:rPr lang="fr-FR" smtClean="0"/>
-              <a:t>13/06/11</a:t>
+              <a:pPr/>
+              <a:t>13/02/2012</a:t>
             </a:fld>
             <a:endParaRPr lang="fr-FR"/>
           </a:p>
@@ -2551,7 +2572,8 @@
           <a:p>
             <a:fld id="{CFD0DC95-9D6E-AF4D-909D-CFABA2629065}" type="slidenum">
               <a:rPr lang="fr-FR" smtClean="0"/>
-              <a:t>‹#›</a:t>
+              <a:pPr/>
+              <a:t>‹N°›</a:t>
             </a:fld>
             <a:endParaRPr lang="fr-FR"/>
           </a:p>
@@ -2560,7 +2582,7 @@
     </p:spTree>
     <p:extLst>
       <p:ext uri="{BB962C8B-B14F-4D97-AF65-F5344CB8AC3E}">
-        <p14:creationId xmlns:p14="http://schemas.microsoft.com/office/powerpoint/2010/main" val="2095368734"/>
+        <p14:creationId xmlns:p14="http://schemas.microsoft.com/office/powerpoint/2010/main" xmlns="" val="2095368734"/>
       </p:ext>
     </p:extLst>
   </p:cSld>
@@ -2722,7 +2744,8 @@
           <a:p>
             <a:fld id="{3B8C2624-D683-524F-9F7E-B731C6C02D7C}" type="datetimeFigureOut">
               <a:rPr lang="fr-FR" smtClean="0"/>
-              <a:t>13/06/11</a:t>
+              <a:pPr/>
+              <a:t>13/02/2012</a:t>
             </a:fld>
             <a:endParaRPr lang="fr-FR"/>
           </a:p>
@@ -2800,7 +2823,8 @@
           <a:p>
             <a:fld id="{CFD0DC95-9D6E-AF4D-909D-CFABA2629065}" type="slidenum">
               <a:rPr lang="fr-FR" smtClean="0"/>
-              <a:t>‹#›</a:t>
+              <a:pPr/>
+              <a:t>‹N°›</a:t>
             </a:fld>
             <a:endParaRPr lang="fr-FR"/>
           </a:p>
@@ -2809,7 +2833,7 @@
     </p:spTree>
     <p:extLst>
       <p:ext uri="{BB962C8B-B14F-4D97-AF65-F5344CB8AC3E}">
-        <p14:creationId xmlns:p14="http://schemas.microsoft.com/office/powerpoint/2010/main" val="1495159096"/>
+        <p14:creationId xmlns:p14="http://schemas.microsoft.com/office/powerpoint/2010/main" xmlns="" val="1495159096"/>
       </p:ext>
     </p:extLst>
   </p:cSld>
@@ -3112,6 +3136,22 @@
           <a:bodyPr/>
           <a:lstStyle/>
           <a:p>
+            <a:r>
+              <a:rPr lang="fr-FR" dirty="0" smtClean="0"/>
+              <a:t>JCertif Mobile </a:t>
+            </a:r>
+            <a:r>
+              <a:rPr lang="fr-FR" dirty="0" err="1" smtClean="0"/>
+              <a:t>Android</a:t>
+            </a:r>
+            <a:r>
+              <a:rPr lang="fr-FR" dirty="0" smtClean="0"/>
+              <a:t> </a:t>
+            </a:r>
+            <a:r>
+              <a:rPr lang="fr-FR" dirty="0" err="1" smtClean="0"/>
+              <a:t>App</a:t>
+            </a:r>
             <a:endParaRPr lang="fr-FR" dirty="0"/>
           </a:p>
         </p:txBody>
@@ -3131,14 +3171,22 @@
           <a:bodyPr/>
           <a:lstStyle/>
           <a:p>
-            <a:endParaRPr lang="fr-FR"/>
+            <a:r>
+              <a:rPr lang="fr-FR" dirty="0" smtClean="0"/>
+              <a:t>Architecture globale et </a:t>
+            </a:r>
+            <a:r>
+              <a:rPr lang="fr-FR" dirty="0" err="1" smtClean="0"/>
+              <a:t>détiallée</a:t>
+            </a:r>
+            <a:endParaRPr lang="fr-FR" dirty="0"/>
           </a:p>
         </p:txBody>
       </p:sp>
     </p:spTree>
     <p:extLst>
       <p:ext uri="{BB962C8B-B14F-4D97-AF65-F5344CB8AC3E}">
-        <p14:creationId xmlns:p14="http://schemas.microsoft.com/office/powerpoint/2010/main" val="608154894"/>
+        <p14:creationId xmlns:p14="http://schemas.microsoft.com/office/powerpoint/2010/main" xmlns="" val="608154894"/>
       </p:ext>
     </p:extLst>
   </p:cSld>
@@ -3202,15 +3250,7 @@
             <a:pPr algn="ctr"/>
             <a:r>
               <a:rPr lang="fr-FR" dirty="0" err="1" smtClean="0"/>
-              <a:t>J</a:t>
-            </a:r>
-            <a:r>
-              <a:rPr lang="fr-FR" dirty="0" err="1" smtClean="0"/>
-              <a:t>c</a:t>
-            </a:r>
-            <a:r>
-              <a:rPr lang="fr-FR" dirty="0" err="1" smtClean="0"/>
-              <a:t>ertif</a:t>
+              <a:t>Jcertif</a:t>
             </a:r>
             <a:r>
               <a:rPr lang="fr-FR" dirty="0" smtClean="0"/>
@@ -3355,11 +3395,7 @@
             </a:r>
             <a:r>
               <a:rPr lang="fr-FR" dirty="0" err="1" smtClean="0"/>
-              <a:t>Andro</a:t>
-            </a:r>
-            <a:r>
-              <a:rPr lang="fr-FR" dirty="0" err="1" smtClean="0"/>
-              <a:t>ïd</a:t>
+              <a:t>Androïd</a:t>
             </a:r>
             <a:r>
               <a:rPr lang="fr-FR" dirty="0" smtClean="0"/>
@@ -3479,15 +3515,7 @@
             <a:pPr algn="ctr"/>
             <a:r>
               <a:rPr lang="fr-FR" dirty="0" err="1" smtClean="0"/>
-              <a:t>J</a:t>
-            </a:r>
-            <a:r>
-              <a:rPr lang="fr-FR" dirty="0" err="1" smtClean="0"/>
-              <a:t>c</a:t>
-            </a:r>
-            <a:r>
-              <a:rPr lang="fr-FR" dirty="0" err="1" smtClean="0"/>
-              <a:t>ertif</a:t>
+              <a:t>Jcertif</a:t>
             </a:r>
             <a:r>
               <a:rPr lang="fr-FR" dirty="0" smtClean="0"/>
@@ -3615,7 +3643,6 @@
               <a:rPr lang="fr-FR" sz="1100" dirty="0" smtClean="0"/>
               <a:t>et d’authentification</a:t>
             </a:r>
-            <a:endParaRPr lang="fr-FR" sz="1100" dirty="0" smtClean="0"/>
           </a:p>
         </p:txBody>
       </p:sp>
@@ -3655,7 +3682,7 @@
     </p:spTree>
     <p:extLst>
       <p:ext uri="{BB962C8B-B14F-4D97-AF65-F5344CB8AC3E}">
-        <p14:creationId xmlns:p14="http://schemas.microsoft.com/office/powerpoint/2010/main" val="2598236864"/>
+        <p14:creationId xmlns:p14="http://schemas.microsoft.com/office/powerpoint/2010/main" xmlns="" val="2598236864"/>
       </p:ext>
     </p:extLst>
   </p:cSld>
@@ -3690,7 +3717,7 @@
         </p:nvSpPr>
         <p:spPr>
           <a:xfrm>
-            <a:off x="2031756" y="250619"/>
+            <a:off x="1991787" y="646515"/>
             <a:ext cx="2083850" cy="514899"/>
           </a:xfrm>
           <a:prstGeom prst="rect">
@@ -3748,7 +3775,7 @@
         </p:nvSpPr>
         <p:spPr>
           <a:xfrm>
-            <a:off x="6766061" y="159811"/>
+            <a:off x="6726092" y="555707"/>
             <a:ext cx="1947289" cy="491821"/>
           </a:xfrm>
           <a:prstGeom prst="rect">
@@ -3790,7 +3817,7 @@
         </p:nvSpPr>
         <p:spPr>
           <a:xfrm>
-            <a:off x="6774816" y="2106657"/>
+            <a:off x="6734847" y="2502553"/>
             <a:ext cx="1997329" cy="457322"/>
           </a:xfrm>
           <a:prstGeom prst="rect">
@@ -3832,7 +3859,7 @@
         </p:nvSpPr>
         <p:spPr>
           <a:xfrm>
-            <a:off x="2031756" y="1626093"/>
+            <a:off x="1991787" y="2021989"/>
             <a:ext cx="2083850" cy="491821"/>
           </a:xfrm>
           <a:prstGeom prst="rect">
@@ -3874,7 +3901,7 @@
         </p:nvSpPr>
         <p:spPr>
           <a:xfrm>
-            <a:off x="4904108" y="3738722"/>
+            <a:off x="4864139" y="4134618"/>
             <a:ext cx="1954048" cy="493846"/>
           </a:xfrm>
           <a:prstGeom prst="rect">
@@ -3932,7 +3959,7 @@
         </p:nvSpPr>
         <p:spPr>
           <a:xfrm>
-            <a:off x="2716641" y="3733041"/>
+            <a:off x="2676672" y="4128937"/>
             <a:ext cx="2067882" cy="479760"/>
           </a:xfrm>
           <a:prstGeom prst="rect">
@@ -3994,7 +4021,7 @@
         </p:nvSpPr>
         <p:spPr>
           <a:xfrm>
-            <a:off x="6784887" y="1109967"/>
+            <a:off x="6744918" y="1505863"/>
             <a:ext cx="1947289" cy="514899"/>
           </a:xfrm>
           <a:prstGeom prst="rect">
@@ -4036,7 +4063,7 @@
         </p:nvSpPr>
         <p:spPr>
           <a:xfrm>
-            <a:off x="4865658" y="5052694"/>
+            <a:off x="4825689" y="5448590"/>
             <a:ext cx="2083850" cy="493847"/>
           </a:xfrm>
           <a:prstGeom prst="rect">
@@ -4082,7 +4109,7 @@
         </p:nvSpPr>
         <p:spPr>
           <a:xfrm>
-            <a:off x="491683" y="2563980"/>
+            <a:off x="451714" y="2959876"/>
             <a:ext cx="2083850" cy="457322"/>
           </a:xfrm>
           <a:prstGeom prst="rect">
@@ -4124,7 +4151,7 @@
         </p:nvSpPr>
         <p:spPr>
           <a:xfrm>
-            <a:off x="3681455" y="2563979"/>
+            <a:off x="3641486" y="2959875"/>
             <a:ext cx="1997329" cy="457322"/>
           </a:xfrm>
           <a:prstGeom prst="rect">
@@ -4166,7 +4193,7 @@
         </p:nvSpPr>
         <p:spPr>
           <a:xfrm>
-            <a:off x="5244542" y="3186545"/>
+            <a:off x="5204573" y="3582441"/>
             <a:ext cx="317409" cy="297353"/>
           </a:xfrm>
           <a:prstGeom prst="lightningBolt">
@@ -4204,7 +4231,7 @@
         </p:nvSpPr>
         <p:spPr>
           <a:xfrm>
-            <a:off x="1112909" y="4542038"/>
+            <a:off x="1072940" y="4937934"/>
             <a:ext cx="914400" cy="1216152"/>
           </a:xfrm>
           <a:prstGeom prst="can">
@@ -4245,7 +4272,7 @@
         </p:nvCxnSpPr>
         <p:spPr>
           <a:xfrm>
-            <a:off x="3073681" y="765518"/>
+            <a:off x="3033712" y="1161414"/>
             <a:ext cx="0" cy="860575"/>
           </a:xfrm>
           <a:prstGeom prst="straightConnector1">
@@ -4281,7 +4308,7 @@
         </p:nvCxnSpPr>
         <p:spPr>
           <a:xfrm flipH="1">
-            <a:off x="1533608" y="2117914"/>
+            <a:off x="1493639" y="2513810"/>
             <a:ext cx="1540073" cy="446066"/>
           </a:xfrm>
           <a:prstGeom prst="straightConnector1">
@@ -4317,7 +4344,7 @@
         </p:nvCxnSpPr>
         <p:spPr>
           <a:xfrm>
-            <a:off x="3073681" y="2117914"/>
+            <a:off x="3033712" y="2513810"/>
             <a:ext cx="1606439" cy="446065"/>
           </a:xfrm>
           <a:prstGeom prst="straightConnector1">
@@ -4353,7 +4380,7 @@
         </p:nvCxnSpPr>
         <p:spPr>
           <a:xfrm>
-            <a:off x="1533608" y="3021302"/>
+            <a:off x="1493639" y="3417198"/>
             <a:ext cx="36501" cy="1520736"/>
           </a:xfrm>
           <a:prstGeom prst="straightConnector1">
@@ -4389,7 +4416,7 @@
         </p:nvCxnSpPr>
         <p:spPr>
           <a:xfrm flipH="1">
-            <a:off x="3750582" y="3021301"/>
+            <a:off x="3710613" y="3417197"/>
             <a:ext cx="929538" cy="711740"/>
           </a:xfrm>
           <a:prstGeom prst="straightConnector1">
@@ -4425,7 +4452,7 @@
         </p:nvCxnSpPr>
         <p:spPr>
           <a:xfrm>
-            <a:off x="4680120" y="3021301"/>
+            <a:off x="4640151" y="3417197"/>
             <a:ext cx="1201012" cy="717421"/>
           </a:xfrm>
           <a:prstGeom prst="straightConnector1">
@@ -4461,7 +4488,7 @@
         </p:nvCxnSpPr>
         <p:spPr>
           <a:xfrm>
-            <a:off x="5881132" y="4232568"/>
+            <a:off x="5841163" y="4628464"/>
             <a:ext cx="26451" cy="820126"/>
           </a:xfrm>
           <a:prstGeom prst="straightConnector1">
@@ -4497,7 +4524,7 @@
         </p:nvCxnSpPr>
         <p:spPr>
           <a:xfrm flipV="1">
-            <a:off x="4115606" y="1367417"/>
+            <a:off x="4075637" y="1763313"/>
             <a:ext cx="2669281" cy="504587"/>
           </a:xfrm>
           <a:prstGeom prst="straightConnector1">
@@ -4533,7 +4560,7 @@
         </p:nvCxnSpPr>
         <p:spPr>
           <a:xfrm flipV="1">
-            <a:off x="4115606" y="405722"/>
+            <a:off x="4075637" y="801618"/>
             <a:ext cx="2650455" cy="102347"/>
           </a:xfrm>
           <a:prstGeom prst="straightConnector1">
@@ -4569,7 +4596,7 @@
         </p:nvCxnSpPr>
         <p:spPr>
           <a:xfrm>
-            <a:off x="4115606" y="1872004"/>
+            <a:off x="4075637" y="2267900"/>
             <a:ext cx="2659210" cy="463314"/>
           </a:xfrm>
           <a:prstGeom prst="straightConnector1">
@@ -4605,7 +4632,7 @@
         </p:nvCxnSpPr>
         <p:spPr>
           <a:xfrm>
-            <a:off x="4115606" y="508069"/>
+            <a:off x="4075637" y="903965"/>
             <a:ext cx="2669281" cy="859348"/>
           </a:xfrm>
           <a:prstGeom prst="straightConnector1">
@@ -4641,7 +4668,7 @@
         </p:nvCxnSpPr>
         <p:spPr>
           <a:xfrm>
-            <a:off x="4115606" y="508069"/>
+            <a:off x="4075637" y="903965"/>
             <a:ext cx="2659210" cy="1827249"/>
           </a:xfrm>
           <a:prstGeom prst="straightConnector1">
@@ -4674,7 +4701,7 @@
         </p:nvSpPr>
         <p:spPr>
           <a:xfrm>
-            <a:off x="4670053" y="205368"/>
+            <a:off x="4630084" y="601264"/>
             <a:ext cx="1647519" cy="261610"/>
           </a:xfrm>
           <a:prstGeom prst="rect">
@@ -4703,7 +4730,7 @@
         </p:nvSpPr>
         <p:spPr>
           <a:xfrm rot="1036650">
-            <a:off x="4984373" y="785225"/>
+            <a:off x="4944404" y="1181121"/>
             <a:ext cx="1647519" cy="261610"/>
           </a:xfrm>
           <a:prstGeom prst="rect">
@@ -4732,7 +4759,7 @@
         </p:nvSpPr>
         <p:spPr>
           <a:xfrm>
-            <a:off x="5423707" y="3188536"/>
+            <a:off x="5383738" y="3584432"/>
             <a:ext cx="1531188" cy="261610"/>
           </a:xfrm>
           <a:prstGeom prst="rect">
@@ -4766,7 +4793,7 @@
         </p:nvSpPr>
         <p:spPr>
           <a:xfrm>
-            <a:off x="6175183" y="4382078"/>
+            <a:off x="6135214" y="4777974"/>
             <a:ext cx="1559423" cy="430887"/>
           </a:xfrm>
           <a:prstGeom prst="rect">
@@ -4818,7 +4845,7 @@
         </p:nvCxnSpPr>
         <p:spPr>
           <a:xfrm>
-            <a:off x="6858156" y="3985645"/>
+            <a:off x="6818187" y="4381541"/>
             <a:ext cx="96739" cy="396433"/>
           </a:xfrm>
           <a:prstGeom prst="line">
@@ -4848,7 +4875,7 @@
         </p:nvSpPr>
         <p:spPr>
           <a:xfrm>
-            <a:off x="7219789" y="2952008"/>
+            <a:off x="7179820" y="3347904"/>
             <a:ext cx="1142360" cy="430887"/>
           </a:xfrm>
           <a:prstGeom prst="rect">
@@ -4900,7 +4927,7 @@
         </p:nvCxnSpPr>
         <p:spPr>
           <a:xfrm>
-            <a:off x="7773481" y="2563979"/>
+            <a:off x="7733512" y="2959875"/>
             <a:ext cx="17488" cy="388029"/>
           </a:xfrm>
           <a:prstGeom prst="line">
@@ -4930,7 +4957,7 @@
         </p:nvSpPr>
         <p:spPr>
           <a:xfrm>
-            <a:off x="1642954" y="3268454"/>
+            <a:off x="1602985" y="3664350"/>
             <a:ext cx="1300356" cy="430887"/>
           </a:xfrm>
           <a:prstGeom prst="rect">
@@ -4974,7 +5001,7 @@
         </p:nvCxnSpPr>
         <p:spPr>
           <a:xfrm>
-            <a:off x="1533608" y="3021302"/>
+            <a:off x="1493639" y="3417198"/>
             <a:ext cx="759524" cy="247152"/>
           </a:xfrm>
           <a:prstGeom prst="line">
@@ -4999,7 +5026,7 @@
     </p:spTree>
     <p:extLst>
       <p:ext uri="{BB962C8B-B14F-4D97-AF65-F5344CB8AC3E}">
-        <p14:creationId xmlns:p14="http://schemas.microsoft.com/office/powerpoint/2010/main" val="3748251690"/>
+        <p14:creationId xmlns:p14="http://schemas.microsoft.com/office/powerpoint/2010/main" xmlns="" val="3748251690"/>
       </p:ext>
     </p:extLst>
   </p:cSld>

</xml_diff>